<commit_message>
Gewichtungs Annotation für tobin
</commit_message>
<xml_diff>
--- a/Files/Unsere Folien.pptx
+++ b/Files/Unsere Folien.pptx
@@ -6,7 +6,7 @@
     <p:sldMasterId id="2147484165" r:id="rId2"/>
   </p:sldMasterIdLst>
   <p:notesMasterIdLst>
-    <p:notesMasterId r:id="rId9"/>
+    <p:notesMasterId r:id="rId11"/>
   </p:notesMasterIdLst>
   <p:sldIdLst>
     <p:sldId id="256" r:id="rId3"/>
@@ -14,7 +14,9 @@
     <p:sldId id="258" r:id="rId5"/>
     <p:sldId id="259" r:id="rId6"/>
     <p:sldId id="260" r:id="rId7"/>
-    <p:sldId id="261" r:id="rId8"/>
+    <p:sldId id="262" r:id="rId8"/>
+    <p:sldId id="261" r:id="rId9"/>
+    <p:sldId id="263" r:id="rId10"/>
   </p:sldIdLst>
   <p:sldSz cx="12192000" cy="6858000"/>
   <p:notesSz cx="6858000" cy="9144000"/>
@@ -1021,6 +1023,13 @@
     <dgm:pt modelId="{7F16B40C-BE7A-461D-9E88-E6EF8E5F919C}" type="pres">
       <dgm:prSet presAssocID="{9316DE0C-5B20-4932-9855-C84620EAFE6D}" presName="sibTrans" presStyleLbl="sibTrans2D1" presStyleIdx="0" presStyleCnt="2"/>
       <dgm:spPr/>
+      <dgm:t>
+        <a:bodyPr/>
+        <a:lstStyle/>
+        <a:p>
+          <a:endParaRPr lang="de-AT"/>
+        </a:p>
+      </dgm:t>
     </dgm:pt>
     <dgm:pt modelId="{3C036747-BB95-4371-8E48-32A9C920F744}" type="pres">
       <dgm:prSet presAssocID="{9316DE0C-5B20-4932-9855-C84620EAFE6D}" presName="spacerB" presStyleCnt="0"/>
@@ -1044,10 +1053,24 @@
     <dgm:pt modelId="{0DCB5306-3428-466A-B8C4-93C7F40ABF77}" type="pres">
       <dgm:prSet presAssocID="{FA50B08F-5E8E-4026-8017-78A5BFCAAE13}" presName="sibTransLast" presStyleLbl="sibTrans2D1" presStyleIdx="1" presStyleCnt="2"/>
       <dgm:spPr/>
+      <dgm:t>
+        <a:bodyPr/>
+        <a:lstStyle/>
+        <a:p>
+          <a:endParaRPr lang="de-AT"/>
+        </a:p>
+      </dgm:t>
     </dgm:pt>
     <dgm:pt modelId="{5C0DC313-38C8-4257-BC2D-B30CBBE03336}" type="pres">
       <dgm:prSet presAssocID="{FA50B08F-5E8E-4026-8017-78A5BFCAAE13}" presName="connectorText" presStyleLbl="sibTrans2D1" presStyleIdx="1" presStyleCnt="2"/>
       <dgm:spPr/>
+      <dgm:t>
+        <a:bodyPr/>
+        <a:lstStyle/>
+        <a:p>
+          <a:endParaRPr lang="de-AT"/>
+        </a:p>
+      </dgm:t>
     </dgm:pt>
     <dgm:pt modelId="{83AE8723-12B3-4A92-A95A-B75DFFB8EF44}" type="pres">
       <dgm:prSet presAssocID="{FA50B08F-5E8E-4026-8017-78A5BFCAAE13}" presName="lastNode" presStyleLbl="node1" presStyleIdx="2" presStyleCnt="3">
@@ -1056,19 +1079,26 @@
         </dgm:presLayoutVars>
       </dgm:prSet>
       <dgm:spPr/>
+      <dgm:t>
+        <a:bodyPr/>
+        <a:lstStyle/>
+        <a:p>
+          <a:endParaRPr lang="de-AT"/>
+        </a:p>
+      </dgm:t>
     </dgm:pt>
   </dgm:ptLst>
   <dgm:cxnLst>
+    <dgm:cxn modelId="{63F281F8-61D8-4402-95D7-C58AC8A41BE3}" srcId="{FA50B08F-5E8E-4026-8017-78A5BFCAAE13}" destId="{1D4EB301-489D-41AA-8055-0C355BDC6999}" srcOrd="0" destOrd="0" parTransId="{361BA697-99F7-4892-A464-8FCC566A6214}" sibTransId="{9316DE0C-5B20-4932-9855-C84620EAFE6D}"/>
+    <dgm:cxn modelId="{7F7311D8-6D93-4EF9-8912-47F888961947}" type="presOf" srcId="{9316DE0C-5B20-4932-9855-C84620EAFE6D}" destId="{7F16B40C-BE7A-461D-9E88-E6EF8E5F919C}" srcOrd="0" destOrd="0" presId="urn:microsoft.com/office/officeart/2005/8/layout/equation2"/>
+    <dgm:cxn modelId="{125E46AD-80C3-43BD-9C90-48F3F4E026ED}" srcId="{FA50B08F-5E8E-4026-8017-78A5BFCAAE13}" destId="{FF3A8904-8F2A-4559-B5BF-5408E7B67053}" srcOrd="1" destOrd="0" parTransId="{AEA02D2B-669D-4D28-9BC3-F0C30169FBC5}" sibTransId="{95953F9B-BD98-402A-B504-03F80E4E30A9}"/>
+    <dgm:cxn modelId="{290131DE-879A-4E82-BEF1-31039CA4893A}" type="presOf" srcId="{95953F9B-BD98-402A-B504-03F80E4E30A9}" destId="{0DCB5306-3428-466A-B8C4-93C7F40ABF77}" srcOrd="0" destOrd="0" presId="urn:microsoft.com/office/officeart/2005/8/layout/equation2"/>
+    <dgm:cxn modelId="{6CC7905D-B322-474B-A99B-F510F1A24F82}" type="presOf" srcId="{2EF1A071-594C-4D20-8D51-62FE82CBB4CA}" destId="{83AE8723-12B3-4A92-A95A-B75DFFB8EF44}" srcOrd="0" destOrd="0" presId="urn:microsoft.com/office/officeart/2005/8/layout/equation2"/>
+    <dgm:cxn modelId="{E1372815-022B-4530-BF1D-65FFF5936FA5}" srcId="{FA50B08F-5E8E-4026-8017-78A5BFCAAE13}" destId="{2EF1A071-594C-4D20-8D51-62FE82CBB4CA}" srcOrd="2" destOrd="0" parTransId="{6363C4D0-C04C-4EEA-BA29-22A1AA940E4C}" sibTransId="{0D4F5E03-A9E9-4BFF-B178-E9FCDC067B07}"/>
+    <dgm:cxn modelId="{B0AB667C-10E8-45E0-81A7-00B2C9D82434}" type="presOf" srcId="{95953F9B-BD98-402A-B504-03F80E4E30A9}" destId="{5C0DC313-38C8-4257-BC2D-B30CBBE03336}" srcOrd="1" destOrd="0" presId="urn:microsoft.com/office/officeart/2005/8/layout/equation2"/>
+    <dgm:cxn modelId="{341C9047-45CE-4A96-9325-D736FB631519}" type="presOf" srcId="{FF3A8904-8F2A-4559-B5BF-5408E7B67053}" destId="{A6820B18-74D0-4AA7-89C9-D6D8B6583D87}" srcOrd="0" destOrd="0" presId="urn:microsoft.com/office/officeart/2005/8/layout/equation2"/>
+    <dgm:cxn modelId="{7D6B1EB8-4E99-4F3A-87FB-9C13153ED425}" type="presOf" srcId="{1D4EB301-489D-41AA-8055-0C355BDC6999}" destId="{EFAEB83F-7869-474B-AA5D-EBDCAB86A0B9}" srcOrd="0" destOrd="0" presId="urn:microsoft.com/office/officeart/2005/8/layout/equation2"/>
     <dgm:cxn modelId="{2C6F8155-67A9-4079-A37B-87E38F17B935}" type="presOf" srcId="{FA50B08F-5E8E-4026-8017-78A5BFCAAE13}" destId="{5EB86B4D-08CA-4F23-BF05-DA0BF5DE96C0}" srcOrd="0" destOrd="0" presId="urn:microsoft.com/office/officeart/2005/8/layout/equation2"/>
-    <dgm:cxn modelId="{125E46AD-80C3-43BD-9C90-48F3F4E026ED}" srcId="{FA50B08F-5E8E-4026-8017-78A5BFCAAE13}" destId="{FF3A8904-8F2A-4559-B5BF-5408E7B67053}" srcOrd="1" destOrd="0" parTransId="{AEA02D2B-669D-4D28-9BC3-F0C30169FBC5}" sibTransId="{95953F9B-BD98-402A-B504-03F80E4E30A9}"/>
-    <dgm:cxn modelId="{7F7311D8-6D93-4EF9-8912-47F888961947}" type="presOf" srcId="{9316DE0C-5B20-4932-9855-C84620EAFE6D}" destId="{7F16B40C-BE7A-461D-9E88-E6EF8E5F919C}" srcOrd="0" destOrd="0" presId="urn:microsoft.com/office/officeart/2005/8/layout/equation2"/>
-    <dgm:cxn modelId="{B0AB667C-10E8-45E0-81A7-00B2C9D82434}" type="presOf" srcId="{95953F9B-BD98-402A-B504-03F80E4E30A9}" destId="{5C0DC313-38C8-4257-BC2D-B30CBBE03336}" srcOrd="1" destOrd="0" presId="urn:microsoft.com/office/officeart/2005/8/layout/equation2"/>
-    <dgm:cxn modelId="{290131DE-879A-4E82-BEF1-31039CA4893A}" type="presOf" srcId="{95953F9B-BD98-402A-B504-03F80E4E30A9}" destId="{0DCB5306-3428-466A-B8C4-93C7F40ABF77}" srcOrd="0" destOrd="0" presId="urn:microsoft.com/office/officeart/2005/8/layout/equation2"/>
-    <dgm:cxn modelId="{7D6B1EB8-4E99-4F3A-87FB-9C13153ED425}" type="presOf" srcId="{1D4EB301-489D-41AA-8055-0C355BDC6999}" destId="{EFAEB83F-7869-474B-AA5D-EBDCAB86A0B9}" srcOrd="0" destOrd="0" presId="urn:microsoft.com/office/officeart/2005/8/layout/equation2"/>
-    <dgm:cxn modelId="{63F281F8-61D8-4402-95D7-C58AC8A41BE3}" srcId="{FA50B08F-5E8E-4026-8017-78A5BFCAAE13}" destId="{1D4EB301-489D-41AA-8055-0C355BDC6999}" srcOrd="0" destOrd="0" parTransId="{361BA697-99F7-4892-A464-8FCC566A6214}" sibTransId="{9316DE0C-5B20-4932-9855-C84620EAFE6D}"/>
-    <dgm:cxn modelId="{E1372815-022B-4530-BF1D-65FFF5936FA5}" srcId="{FA50B08F-5E8E-4026-8017-78A5BFCAAE13}" destId="{2EF1A071-594C-4D20-8D51-62FE82CBB4CA}" srcOrd="2" destOrd="0" parTransId="{6363C4D0-C04C-4EEA-BA29-22A1AA940E4C}" sibTransId="{0D4F5E03-A9E9-4BFF-B178-E9FCDC067B07}"/>
-    <dgm:cxn modelId="{6CC7905D-B322-474B-A99B-F510F1A24F82}" type="presOf" srcId="{2EF1A071-594C-4D20-8D51-62FE82CBB4CA}" destId="{83AE8723-12B3-4A92-A95A-B75DFFB8EF44}" srcOrd="0" destOrd="0" presId="urn:microsoft.com/office/officeart/2005/8/layout/equation2"/>
-    <dgm:cxn modelId="{341C9047-45CE-4A96-9325-D736FB631519}" type="presOf" srcId="{FF3A8904-8F2A-4559-B5BF-5408E7B67053}" destId="{A6820B18-74D0-4AA7-89C9-D6D8B6583D87}" srcOrd="0" destOrd="0" presId="urn:microsoft.com/office/officeart/2005/8/layout/equation2"/>
     <dgm:cxn modelId="{92E5CC2B-40B8-4A62-B3C0-32B5BA09A351}" type="presParOf" srcId="{5EB86B4D-08CA-4F23-BF05-DA0BF5DE96C0}" destId="{FC733417-C474-4401-9E46-0EF3974E17EC}" srcOrd="0" destOrd="0" presId="urn:microsoft.com/office/officeart/2005/8/layout/equation2"/>
     <dgm:cxn modelId="{379DD67F-FAA9-4136-B561-D27D503BE942}" type="presParOf" srcId="{FC733417-C474-4401-9E46-0EF3974E17EC}" destId="{EFAEB83F-7869-474B-AA5D-EBDCAB86A0B9}" srcOrd="0" destOrd="0" presId="urn:microsoft.com/office/officeart/2005/8/layout/equation2"/>
     <dgm:cxn modelId="{BDD88F6E-0E90-4CFE-8A0A-37320DDEB62E}" type="presParOf" srcId="{FC733417-C474-4401-9E46-0EF3974E17EC}" destId="{495F9EC5-277F-4077-8F40-0A2C926126B5}" srcOrd="1" destOrd="0" presId="urn:microsoft.com/office/officeart/2005/8/layout/equation2"/>
@@ -2953,7 +2983,7 @@
           <a:p>
             <a:fld id="{6B9515E5-0190-44C7-B9DE-93188D640A17}" type="datetimeFigureOut">
               <a:rPr lang="de-DE" smtClean="0"/>
-              <a:t>22.02.2015</a:t>
+              <a:t>23.02.2015</a:t>
             </a:fld>
             <a:endParaRPr lang="de-DE"/>
           </a:p>
@@ -3447,7 +3477,7 @@
           <a:p>
             <a:fld id="{4B2DA33B-01F4-4E5A-9D60-CCCF83777004}" type="datetime1">
               <a:rPr lang="de-DE" smtClean="0"/>
-              <a:t>22.02.2015</a:t>
+              <a:t>23.02.2015</a:t>
             </a:fld>
             <a:endParaRPr lang="de-DE"/>
           </a:p>
@@ -3617,7 +3647,7 @@
           <a:p>
             <a:fld id="{899D4D3C-5AF5-44B6-83AB-BAD62DB4E383}" type="datetime1">
               <a:rPr lang="de-DE" smtClean="0"/>
-              <a:t>22.02.2015</a:t>
+              <a:t>23.02.2015</a:t>
             </a:fld>
             <a:endParaRPr lang="de-DE"/>
           </a:p>
@@ -3797,7 +3827,7 @@
           <a:p>
             <a:fld id="{856AF03E-FB57-4CEE-A6F6-9C1ADE319FF8}" type="datetime1">
               <a:rPr lang="de-DE" smtClean="0"/>
-              <a:t>22.02.2015</a:t>
+              <a:t>23.02.2015</a:t>
             </a:fld>
             <a:endParaRPr lang="de-DE"/>
           </a:p>
@@ -4046,7 +4076,7 @@
           <a:p>
             <a:fld id="{BBECC11B-F07F-400A-879F-C841C198AFB2}" type="datetime1">
               <a:rPr lang="de-DE" smtClean="0"/>
-              <a:t>22.02.2015</a:t>
+              <a:t>23.02.2015</a:t>
             </a:fld>
             <a:endParaRPr lang="de-DE"/>
           </a:p>
@@ -4313,7 +4343,7 @@
           <a:p>
             <a:fld id="{3699CA22-3EA1-4D0C-9E86-3C34967C15AA}" type="datetime1">
               <a:rPr lang="de-DE" smtClean="0"/>
-              <a:t>22.02.2015</a:t>
+              <a:t>23.02.2015</a:t>
             </a:fld>
             <a:endParaRPr lang="de-DE"/>
           </a:p>
@@ -4642,7 +4672,7 @@
           <a:p>
             <a:fld id="{B2A1934B-ABA4-48DE-9708-5F58958F52E1}" type="datetime1">
               <a:rPr lang="de-DE" smtClean="0"/>
-              <a:t>22.02.2015</a:t>
+              <a:t>23.02.2015</a:t>
             </a:fld>
             <a:endParaRPr lang="de-DE"/>
           </a:p>
@@ -4965,7 +4995,7 @@
           <a:p>
             <a:fld id="{D6222B0F-67F7-47F2-83BE-003DDC0B8177}" type="datetime1">
               <a:rPr lang="de-DE" smtClean="0"/>
-              <a:t>22.02.2015</a:t>
+              <a:t>23.02.2015</a:t>
             </a:fld>
             <a:endParaRPr lang="de-DE"/>
           </a:p>
@@ -5422,7 +5452,7 @@
           <a:p>
             <a:fld id="{86BBD164-1E7D-44FC-B404-460BD00DCEF9}" type="datetime1">
               <a:rPr lang="de-DE" smtClean="0"/>
-              <a:t>22.02.2015</a:t>
+              <a:t>23.02.2015</a:t>
             </a:fld>
             <a:endParaRPr lang="de-DE"/>
           </a:p>
@@ -5627,7 +5657,7 @@
           <a:p>
             <a:fld id="{0A78F9AE-502C-4615-B089-AB7DD41D4282}" type="datetime1">
               <a:rPr lang="de-DE" smtClean="0"/>
-              <a:t>22.02.2015</a:t>
+              <a:t>23.02.2015</a:t>
             </a:fld>
             <a:endParaRPr lang="de-DE"/>
           </a:p>
@@ -5804,7 +5834,7 @@
           <a:p>
             <a:fld id="{91E6437C-45E1-4608-A1B6-D1BD0402B652}" type="datetime1">
               <a:rPr lang="de-DE" smtClean="0"/>
-              <a:t>22.02.2015</a:t>
+              <a:t>23.02.2015</a:t>
             </a:fld>
             <a:endParaRPr lang="de-DE"/>
           </a:p>
@@ -6137,7 +6167,7 @@
           <a:p>
             <a:fld id="{44D16251-3E7F-4045-A4CD-20DECB59E8E4}" type="datetime1">
               <a:rPr lang="de-DE" smtClean="0"/>
-              <a:t>22.02.2015</a:t>
+              <a:t>23.02.2015</a:t>
             </a:fld>
             <a:endParaRPr lang="de-DE"/>
           </a:p>
@@ -6389,7 +6419,7 @@
           <a:p>
             <a:fld id="{1A3B3180-84DB-483E-AEC3-8C62C993C786}" type="datetime1">
               <a:rPr lang="de-DE" smtClean="0"/>
-              <a:t>22.02.2015</a:t>
+              <a:t>23.02.2015</a:t>
             </a:fld>
             <a:endParaRPr lang="de-DE"/>
           </a:p>
@@ -6652,7 +6682,7 @@
           <a:p>
             <a:fld id="{46423CAB-345F-46CA-A325-C4659D940990}" type="datetime1">
               <a:rPr lang="de-DE" smtClean="0"/>
-              <a:t>22.02.2015</a:t>
+              <a:t>23.02.2015</a:t>
             </a:fld>
             <a:endParaRPr lang="de-DE"/>
           </a:p>
@@ -6990,7 +7020,7 @@
           <a:p>
             <a:fld id="{ED98FAEA-560B-444C-85D5-EEF10816C9B9}" type="datetime1">
               <a:rPr lang="de-DE" smtClean="0"/>
-              <a:t>22.02.2015</a:t>
+              <a:t>23.02.2015</a:t>
             </a:fld>
             <a:endParaRPr lang="de-DE"/>
           </a:p>
@@ -7391,7 +7421,7 @@
           <a:p>
             <a:fld id="{FED96219-1420-4CF6-85F6-EE7B6D90CCFE}" type="datetime1">
               <a:rPr lang="de-DE" smtClean="0"/>
-              <a:t>22.02.2015</a:t>
+              <a:t>23.02.2015</a:t>
             </a:fld>
             <a:endParaRPr lang="de-DE"/>
           </a:p>
@@ -7727,7 +7757,7 @@
           <a:p>
             <a:fld id="{6DCD520C-CCAD-4564-A295-2146E66BF700}" type="datetime1">
               <a:rPr lang="de-DE" smtClean="0"/>
-              <a:t>22.02.2015</a:t>
+              <a:t>23.02.2015</a:t>
             </a:fld>
             <a:endParaRPr lang="de-DE"/>
           </a:p>
@@ -8047,7 +8077,7 @@
           <a:p>
             <a:fld id="{5303ADF1-BA39-4966-B599-E5DE9069A942}" type="datetime1">
               <a:rPr lang="de-DE" smtClean="0"/>
-              <a:t>22.02.2015</a:t>
+              <a:t>23.02.2015</a:t>
             </a:fld>
             <a:endParaRPr lang="de-DE"/>
           </a:p>
@@ -8443,7 +8473,7 @@
           <a:p>
             <a:fld id="{745F2CDD-4B4E-44FC-BCE0-B946B2949EF8}" type="datetime1">
               <a:rPr lang="de-DE" smtClean="0"/>
-              <a:t>22.02.2015</a:t>
+              <a:t>23.02.2015</a:t>
             </a:fld>
             <a:endParaRPr lang="de-DE"/>
           </a:p>
@@ -8700,7 +8730,7 @@
           <a:p>
             <a:fld id="{D1F91790-9A49-452E-8EB3-9631716D53D7}" type="datetime1">
               <a:rPr lang="de-DE" smtClean="0"/>
-              <a:t>22.02.2015</a:t>
+              <a:t>23.02.2015</a:t>
             </a:fld>
             <a:endParaRPr lang="de-DE"/>
           </a:p>
@@ -8962,7 +8992,7 @@
           <a:p>
             <a:fld id="{6AE447E0-09DE-441D-BDDF-5D85CEC4E749}" type="datetime1">
               <a:rPr lang="de-DE" smtClean="0"/>
-              <a:t>22.02.2015</a:t>
+              <a:t>23.02.2015</a:t>
             </a:fld>
             <a:endParaRPr lang="de-DE"/>
           </a:p>
@@ -9295,7 +9325,7 @@
           <a:p>
             <a:fld id="{9AA91B9C-9AA9-4209-9C7F-32C604D73EF8}" type="datetime1">
               <a:rPr lang="de-DE" smtClean="0"/>
-              <a:t>22.02.2015</a:t>
+              <a:t>23.02.2015</a:t>
             </a:fld>
             <a:endParaRPr lang="de-DE"/>
           </a:p>
@@ -9527,7 +9557,7 @@
           <a:p>
             <a:fld id="{F3FDD1EB-0920-4C81-BB5D-6AFA169EF380}" type="datetime1">
               <a:rPr lang="de-DE" smtClean="0"/>
-              <a:t>22.02.2015</a:t>
+              <a:t>23.02.2015</a:t>
             </a:fld>
             <a:endParaRPr lang="de-DE"/>
           </a:p>
@@ -9874,7 +9904,7 @@
           <a:p>
             <a:fld id="{7CE8D244-B374-408D-8697-5AC33D233097}" type="datetime1">
               <a:rPr lang="de-DE" smtClean="0"/>
-              <a:t>22.02.2015</a:t>
+              <a:t>23.02.2015</a:t>
             </a:fld>
             <a:endParaRPr lang="de-DE"/>
           </a:p>
@@ -9992,7 +10022,7 @@
           <a:p>
             <a:fld id="{92C1D99C-C0E8-48D6-8EF8-A18983AFD8F7}" type="datetime1">
               <a:rPr lang="de-DE" smtClean="0"/>
-              <a:t>22.02.2015</a:t>
+              <a:t>23.02.2015</a:t>
             </a:fld>
             <a:endParaRPr lang="de-DE"/>
           </a:p>
@@ -10110,7 +10140,7 @@
           <a:p>
             <a:fld id="{2C486229-3117-4CF0-8DC5-2835D949DC9F}" type="datetime1">
               <a:rPr lang="de-DE" smtClean="0"/>
-              <a:t>22.02.2015</a:t>
+              <a:t>23.02.2015</a:t>
             </a:fld>
             <a:endParaRPr lang="de-DE"/>
           </a:p>
@@ -10394,7 +10424,7 @@
           <a:p>
             <a:fld id="{B4E6A621-E14F-44A9-8777-143BE4E1CFDA}" type="datetime1">
               <a:rPr lang="de-DE" smtClean="0"/>
-              <a:t>22.02.2015</a:t>
+              <a:t>23.02.2015</a:t>
             </a:fld>
             <a:endParaRPr lang="de-DE"/>
           </a:p>
@@ -10658,7 +10688,7 @@
           <a:p>
             <a:fld id="{AC61B373-DCCA-47EB-9E63-48452AB7C423}" type="datetime1">
               <a:rPr lang="de-DE" smtClean="0"/>
-              <a:t>22.02.2015</a:t>
+              <a:t>23.02.2015</a:t>
             </a:fld>
             <a:endParaRPr lang="de-DE"/>
           </a:p>
@@ -10872,7 +10902,7 @@
           <a:p>
             <a:fld id="{8A523CE0-84C1-4AC9-92E9-93814978B077}" type="datetime1">
               <a:rPr lang="de-DE" smtClean="0"/>
-              <a:t>22.02.2015</a:t>
+              <a:t>23.02.2015</a:t>
             </a:fld>
             <a:endParaRPr lang="de-DE"/>
           </a:p>
@@ -13219,7 +13249,7 @@
           <a:p>
             <a:fld id="{E87CD86D-0672-4934-B984-F8F8E2647741}" type="datetime1">
               <a:rPr lang="de-DE" smtClean="0"/>
-              <a:t>22.02.2015</a:t>
+              <a:t>23.02.2015</a:t>
             </a:fld>
             <a:endParaRPr lang="de-DE"/>
           </a:p>
@@ -14218,11 +14248,7 @@
             </a:pPr>
             <a:r>
               <a:rPr lang="de-DE" sz="3200" dirty="0" smtClean="0"/>
-              <a:t> </a:t>
-            </a:r>
-            <a:r>
-              <a:rPr lang="de-DE" sz="3200" dirty="0" smtClean="0"/>
-              <a:t>Minimum-Varianz-Portfolio</a:t>
+              <a:t> Minimum-Varianz-Portfolio</a:t>
             </a:r>
           </a:p>
           <a:p>
@@ -14246,7 +14272,6 @@
               <a:rPr lang="de-DE" sz="3000" dirty="0" smtClean="0"/>
               <a:t>Maximiere Rendite bei gegebener Volatilität</a:t>
             </a:r>
-            <a:endParaRPr lang="de-DE" sz="3000" dirty="0" smtClean="0"/>
           </a:p>
         </p:txBody>
       </p:sp>
@@ -14993,6 +15018,463 @@
             <p:ph type="title"/>
           </p:nvPr>
         </p:nvSpPr>
+        <p:spPr/>
+        <p:txBody>
+          <a:bodyPr>
+            <a:normAutofit/>
+          </a:bodyPr>
+          <a:lstStyle/>
+          <a:p>
+            <a:r>
+              <a:rPr lang="de-AT" sz="4800" dirty="0"/>
+              <a:t>Cash &amp; Stocks</a:t>
+            </a:r>
+            <a:endParaRPr lang="de-AT" sz="4800" dirty="0"/>
+          </a:p>
+        </p:txBody>
+      </p:sp>
+      <mc:AlternateContent xmlns:mc="http://schemas.openxmlformats.org/markup-compatibility/2006">
+        <mc:Choice xmlns:a14="http://schemas.microsoft.com/office/drawing/2010/main" Requires="a14">
+          <p:sp>
+            <p:nvSpPr>
+              <p:cNvPr id="3" name="Inhaltsplatzhalter 2"/>
+              <p:cNvSpPr>
+                <a:spLocks noGrp="1"/>
+              </p:cNvSpPr>
+              <p:nvPr>
+                <p:ph idx="1"/>
+              </p:nvPr>
+            </p:nvSpPr>
+            <p:spPr/>
+            <p:txBody>
+              <a:bodyPr/>
+              <a:lstStyle/>
+              <a:p>
+                <a:r>
+                  <a:rPr lang="de-AT" sz="2800" dirty="0"/>
+                  <a:t>Korrelation zwischen Cash und Stock ist </a:t>
+                </a:r>
+                <a:r>
+                  <a:rPr lang="de-AT" sz="2800" dirty="0" smtClean="0"/>
+                  <a:t>0</a:t>
+                </a:r>
+              </a:p>
+              <a:p>
+                <a:endParaRPr lang="de-AT" dirty="0" smtClean="0"/>
+              </a:p>
+              <a:p>
+                <a:pPr marL="0" indent="0">
+                  <a:buNone/>
+                </a:pPr>
+                <a14:m>
+                  <m:oMathPara xmlns:m="http://schemas.openxmlformats.org/officeDocument/2006/math">
+                    <m:oMathParaPr>
+                      <m:jc m:val="centerGroup"/>
+                    </m:oMathParaPr>
+                    <m:oMath xmlns:m="http://schemas.openxmlformats.org/officeDocument/2006/math">
+                      <m:r>
+                        <a:rPr lang="de-AT" sz="2000" i="1" smtClean="0">
+                          <a:latin typeface="Cambria Math" panose="02040503050406030204" pitchFamily="18" charset="0"/>
+                          <a:ea typeface="Cambria Math" panose="02040503050406030204" pitchFamily="18" charset="0"/>
+                        </a:rPr>
+                        <m:t>𝜎</m:t>
+                      </m:r>
+                      <m:d>
+                        <m:dPr>
+                          <m:ctrlPr>
+                            <a:rPr lang="de-AT" sz="2000" b="0" i="1" smtClean="0">
+                              <a:latin typeface="Cambria Math" panose="02040503050406030204" pitchFamily="18" charset="0"/>
+                              <a:ea typeface="Cambria Math" panose="02040503050406030204" pitchFamily="18" charset="0"/>
+                            </a:rPr>
+                          </m:ctrlPr>
+                        </m:dPr>
+                        <m:e>
+                          <m:sSub>
+                            <m:sSubPr>
+                              <m:ctrlPr>
+                                <a:rPr lang="de-AT" sz="2000" b="0" i="1" smtClean="0">
+                                  <a:latin typeface="Cambria Math" panose="02040503050406030204" pitchFamily="18" charset="0"/>
+                                  <a:ea typeface="Cambria Math" panose="02040503050406030204" pitchFamily="18" charset="0"/>
+                                </a:rPr>
+                              </m:ctrlPr>
+                            </m:sSubPr>
+                            <m:e>
+                              <m:r>
+                                <a:rPr lang="de-AT" sz="2000" i="1">
+                                  <a:latin typeface="Cambria Math" panose="02040503050406030204" pitchFamily="18" charset="0"/>
+                                  <a:ea typeface="Cambria Math" panose="02040503050406030204" pitchFamily="18" charset="0"/>
+                                </a:rPr>
+                                <m:t>𝑟</m:t>
+                              </m:r>
+                            </m:e>
+                            <m:sub>
+                              <m:r>
+                                <a:rPr lang="de-AT" sz="2000" b="0" i="1" smtClean="0">
+                                  <a:latin typeface="Cambria Math" panose="02040503050406030204" pitchFamily="18" charset="0"/>
+                                  <a:ea typeface="Cambria Math" panose="02040503050406030204" pitchFamily="18" charset="0"/>
+                                </a:rPr>
+                                <m:t>𝑝</m:t>
+                              </m:r>
+                            </m:sub>
+                          </m:sSub>
+                          <m:r>
+                            <m:rPr>
+                              <m:nor/>
+                            </m:rPr>
+                            <a:rPr lang="de-AT" sz="2000" dirty="0"/>
+                            <m:t>) = (1 - </m:t>
+                          </m:r>
+                          <m:r>
+                            <m:rPr>
+                              <m:sty m:val="p"/>
+                            </m:rPr>
+                            <a:rPr lang="de-AT" sz="2000" i="1" dirty="0" smtClean="0">
+                              <a:latin typeface="Cambria Math" panose="02040503050406030204" pitchFamily="18" charset="0"/>
+                              <a:ea typeface="Cambria Math" panose="02040503050406030204" pitchFamily="18" charset="0"/>
+                            </a:rPr>
+                            <m:t>α</m:t>
+                          </m:r>
+                        </m:e>
+                      </m:d>
+                      <m:r>
+                        <a:rPr lang="de-AT" sz="2000" b="0" i="1" dirty="0" smtClean="0">
+                          <a:latin typeface="Cambria Math" panose="02040503050406030204" pitchFamily="18" charset="0"/>
+                          <a:ea typeface="Cambria Math" panose="02040503050406030204" pitchFamily="18" charset="0"/>
+                        </a:rPr>
+                        <m:t>∗</m:t>
+                      </m:r>
+                      <m:r>
+                        <a:rPr lang="de-AT" sz="2000" i="1">
+                          <a:latin typeface="Cambria Math" panose="02040503050406030204" pitchFamily="18" charset="0"/>
+                          <a:ea typeface="Cambria Math" panose="02040503050406030204" pitchFamily="18" charset="0"/>
+                        </a:rPr>
+                        <m:t>𝜎</m:t>
+                      </m:r>
+                      <m:r>
+                        <a:rPr lang="de-AT" sz="2000" b="0" i="1" dirty="0" smtClean="0">
+                          <a:latin typeface="Cambria Math" panose="02040503050406030204" pitchFamily="18" charset="0"/>
+                          <a:ea typeface="Cambria Math" panose="02040503050406030204" pitchFamily="18" charset="0"/>
+                        </a:rPr>
+                        <m:t>(</m:t>
+                      </m:r>
+                      <m:sSub>
+                        <m:sSubPr>
+                          <m:ctrlPr>
+                            <a:rPr lang="de-AT" sz="2000" i="1">
+                              <a:latin typeface="Cambria Math" panose="02040503050406030204" pitchFamily="18" charset="0"/>
+                              <a:ea typeface="Cambria Math" panose="02040503050406030204" pitchFamily="18" charset="0"/>
+                            </a:rPr>
+                          </m:ctrlPr>
+                        </m:sSubPr>
+                        <m:e>
+                          <m:r>
+                            <a:rPr lang="de-AT" sz="2000" i="1">
+                              <a:latin typeface="Cambria Math" panose="02040503050406030204" pitchFamily="18" charset="0"/>
+                              <a:ea typeface="Cambria Math" panose="02040503050406030204" pitchFamily="18" charset="0"/>
+                            </a:rPr>
+                            <m:t>𝑟</m:t>
+                          </m:r>
+                        </m:e>
+                        <m:sub>
+                          <m:r>
+                            <a:rPr lang="de-AT" sz="2000" b="0" i="1" smtClean="0">
+                              <a:latin typeface="Cambria Math" panose="02040503050406030204" pitchFamily="18" charset="0"/>
+                              <a:ea typeface="Cambria Math" panose="02040503050406030204" pitchFamily="18" charset="0"/>
+                            </a:rPr>
+                            <m:t>𝑚</m:t>
+                          </m:r>
+                        </m:sub>
+                      </m:sSub>
+                      <m:r>
+                        <m:rPr>
+                          <m:nor/>
+                        </m:rPr>
+                        <a:rPr lang="de-AT" sz="2000" dirty="0"/>
+                        <m:t>)</m:t>
+                      </m:r>
+                    </m:oMath>
+                  </m:oMathPara>
+                </a14:m>
+                <a:endParaRPr lang="de-AT" sz="2000" dirty="0" smtClean="0"/>
+              </a:p>
+              <a:p>
+                <a:pPr marL="0" indent="0" algn="ctr">
+                  <a:buNone/>
+                </a:pPr>
+                <a14:m>
+                  <m:oMath xmlns:m="http://schemas.openxmlformats.org/officeDocument/2006/math">
+                    <m:r>
+                      <a:rPr lang="de-AT" sz="2000" b="0" i="1" smtClean="0">
+                        <a:latin typeface="Cambria Math" panose="02040503050406030204" pitchFamily="18" charset="0"/>
+                      </a:rPr>
+                      <m:t>𝐸</m:t>
+                    </m:r>
+                    <m:d>
+                      <m:dPr>
+                        <m:ctrlPr>
+                          <a:rPr lang="de-AT" sz="2000" b="0" i="1" smtClean="0">
+                            <a:latin typeface="Cambria Math" panose="02040503050406030204" pitchFamily="18" charset="0"/>
+                          </a:rPr>
+                        </m:ctrlPr>
+                      </m:dPr>
+                      <m:e>
+                        <m:sSub>
+                          <m:sSubPr>
+                            <m:ctrlPr>
+                              <a:rPr lang="de-AT" sz="2000" i="1" smtClean="0">
+                                <a:latin typeface="Cambria Math" panose="02040503050406030204" pitchFamily="18" charset="0"/>
+                              </a:rPr>
+                            </m:ctrlPr>
+                          </m:sSubPr>
+                          <m:e>
+                            <m:r>
+                              <a:rPr lang="de-AT" sz="2000" b="0" i="1" smtClean="0">
+                                <a:latin typeface="Cambria Math" panose="02040503050406030204" pitchFamily="18" charset="0"/>
+                              </a:rPr>
+                              <m:t>𝑟</m:t>
+                            </m:r>
+                          </m:e>
+                          <m:sub>
+                            <m:r>
+                              <a:rPr lang="de-AT" sz="2000" b="0" i="1" smtClean="0">
+                                <a:latin typeface="Cambria Math" panose="02040503050406030204" pitchFamily="18" charset="0"/>
+                              </a:rPr>
+                              <m:t>𝑝</m:t>
+                            </m:r>
+                          </m:sub>
+                        </m:sSub>
+                      </m:e>
+                    </m:d>
+                    <m:r>
+                      <a:rPr lang="de-AT" sz="2000" b="0" i="1" smtClean="0">
+                        <a:latin typeface="Cambria Math" panose="02040503050406030204" pitchFamily="18" charset="0"/>
+                      </a:rPr>
+                      <m:t>= </m:t>
+                    </m:r>
+                    <m:r>
+                      <a:rPr lang="de-AT" sz="2000" b="0" i="1" smtClean="0">
+                        <a:latin typeface="Cambria Math" panose="02040503050406030204" pitchFamily="18" charset="0"/>
+                        <a:ea typeface="Cambria Math" panose="02040503050406030204" pitchFamily="18" charset="0"/>
+                      </a:rPr>
+                      <m:t>𝛼</m:t>
+                    </m:r>
+                    <m:r>
+                      <a:rPr lang="de-AT" sz="2000" b="0" i="1" smtClean="0">
+                        <a:latin typeface="Cambria Math" panose="02040503050406030204" pitchFamily="18" charset="0"/>
+                        <a:ea typeface="Cambria Math" panose="02040503050406030204" pitchFamily="18" charset="0"/>
+                      </a:rPr>
+                      <m:t>∗</m:t>
+                    </m:r>
+                    <m:r>
+                      <a:rPr lang="de-AT" sz="2000" b="0" i="1" smtClean="0">
+                        <a:latin typeface="Cambria Math" panose="02040503050406030204" pitchFamily="18" charset="0"/>
+                        <a:ea typeface="Cambria Math" panose="02040503050406030204" pitchFamily="18" charset="0"/>
+                      </a:rPr>
+                      <m:t>𝑟</m:t>
+                    </m:r>
+                    <m:r>
+                      <a:rPr lang="de-AT" sz="2000" b="0" i="1" smtClean="0">
+                        <a:latin typeface="Cambria Math" panose="02040503050406030204" pitchFamily="18" charset="0"/>
+                        <a:ea typeface="Cambria Math" panose="02040503050406030204" pitchFamily="18" charset="0"/>
+                      </a:rPr>
+                      <m:t>+</m:t>
+                    </m:r>
+                    <m:d>
+                      <m:dPr>
+                        <m:ctrlPr>
+                          <a:rPr lang="de-AT" sz="2000" b="0" i="1" smtClean="0">
+                            <a:latin typeface="Cambria Math" panose="02040503050406030204" pitchFamily="18" charset="0"/>
+                            <a:ea typeface="Cambria Math" panose="02040503050406030204" pitchFamily="18" charset="0"/>
+                          </a:rPr>
+                        </m:ctrlPr>
+                      </m:dPr>
+                      <m:e>
+                        <m:r>
+                          <a:rPr lang="de-AT" sz="2000" b="0" i="1" smtClean="0">
+                            <a:latin typeface="Cambria Math" panose="02040503050406030204" pitchFamily="18" charset="0"/>
+                            <a:ea typeface="Cambria Math" panose="02040503050406030204" pitchFamily="18" charset="0"/>
+                          </a:rPr>
+                          <m:t>1−</m:t>
+                        </m:r>
+                        <m:r>
+                          <a:rPr lang="de-AT" sz="2000" b="0" i="1" smtClean="0">
+                            <a:latin typeface="Cambria Math" panose="02040503050406030204" pitchFamily="18" charset="0"/>
+                            <a:ea typeface="Cambria Math" panose="02040503050406030204" pitchFamily="18" charset="0"/>
+                          </a:rPr>
+                          <m:t>𝛼</m:t>
+                        </m:r>
+                      </m:e>
+                    </m:d>
+                    <m:r>
+                      <a:rPr lang="de-AT" sz="2000" b="0" i="1" smtClean="0">
+                        <a:latin typeface="Cambria Math" panose="02040503050406030204" pitchFamily="18" charset="0"/>
+                        <a:ea typeface="Cambria Math" panose="02040503050406030204" pitchFamily="18" charset="0"/>
+                      </a:rPr>
+                      <m:t>∗</m:t>
+                    </m:r>
+                    <m:r>
+                      <a:rPr lang="de-AT" sz="2000" b="0" i="1" smtClean="0">
+                        <a:latin typeface="Cambria Math" panose="02040503050406030204" pitchFamily="18" charset="0"/>
+                        <a:ea typeface="Cambria Math" panose="02040503050406030204" pitchFamily="18" charset="0"/>
+                      </a:rPr>
+                      <m:t>𝐸</m:t>
+                    </m:r>
+                  </m:oMath>
+                </a14:m>
+                <a:r>
+                  <a:rPr lang="de-AT" sz="2000" dirty="0" smtClean="0"/>
+                  <a:t>(</a:t>
+                </a:r>
+                <a14:m>
+                  <m:oMath xmlns:m="http://schemas.openxmlformats.org/officeDocument/2006/math">
+                    <m:sSub>
+                      <m:sSubPr>
+                        <m:ctrlPr>
+                          <a:rPr lang="de-AT" sz="2000" i="1">
+                            <a:latin typeface="Cambria Math" panose="02040503050406030204" pitchFamily="18" charset="0"/>
+                          </a:rPr>
+                        </m:ctrlPr>
+                      </m:sSubPr>
+                      <m:e>
+                        <m:r>
+                          <a:rPr lang="de-AT" sz="2000" i="1">
+                            <a:latin typeface="Cambria Math" panose="02040503050406030204" pitchFamily="18" charset="0"/>
+                          </a:rPr>
+                          <m:t>𝑟</m:t>
+                        </m:r>
+                      </m:e>
+                      <m:sub>
+                        <m:r>
+                          <a:rPr lang="de-AT" sz="2000" b="0" i="1" smtClean="0">
+                            <a:latin typeface="Cambria Math" panose="02040503050406030204" pitchFamily="18" charset="0"/>
+                          </a:rPr>
+                          <m:t>𝑀</m:t>
+                        </m:r>
+                      </m:sub>
+                    </m:sSub>
+                    <m:r>
+                      <a:rPr lang="de-AT" sz="2000" b="0" i="1" smtClean="0">
+                        <a:latin typeface="Cambria Math" panose="02040503050406030204" pitchFamily="18" charset="0"/>
+                      </a:rPr>
+                      <m:t>)</m:t>
+                    </m:r>
+                  </m:oMath>
+                </a14:m>
+                <a:endParaRPr lang="de-AT" sz="2000" dirty="0" smtClean="0"/>
+              </a:p>
+              <a:p>
+                <a:pPr marL="0" indent="0" algn="ctr">
+                  <a:buNone/>
+                </a:pPr>
+                <a:endParaRPr lang="de-AT" sz="2000" dirty="0" smtClean="0"/>
+              </a:p>
+              <a:p>
+                <a:r>
+                  <a:rPr lang="de-AT" sz="2800" dirty="0" smtClean="0"/>
+                  <a:t>Tangential Portfolio mit der größten Steigung stellt ein optimales riskantes Portfolio dar</a:t>
+                </a:r>
+                <a:endParaRPr lang="de-AT" sz="2800" dirty="0"/>
+              </a:p>
+            </p:txBody>
+          </p:sp>
+        </mc:Choice>
+        <mc:Fallback>
+          <p:sp>
+            <p:nvSpPr>
+              <p:cNvPr id="3" name="Inhaltsplatzhalter 2"/>
+              <p:cNvSpPr>
+                <a:spLocks noGrp="1" noRot="1" noChangeAspect="1" noMove="1" noResize="1" noEditPoints="1" noAdjustHandles="1" noChangeArrowheads="1" noChangeShapeType="1" noTextEdit="1"/>
+              </p:cNvSpPr>
+              <p:nvPr>
+                <p:ph idx="1"/>
+              </p:nvPr>
+            </p:nvSpPr>
+            <p:spPr>
+              <a:blipFill rotWithShape="0">
+                <a:blip r:embed="rId2"/>
+                <a:stretch>
+                  <a:fillRect l="-1300" t="-1613"/>
+                </a:stretch>
+              </a:blipFill>
+            </p:spPr>
+            <p:txBody>
+              <a:bodyPr/>
+              <a:lstStyle/>
+              <a:p>
+                <a:r>
+                  <a:rPr lang="de-AT">
+                    <a:noFill/>
+                  </a:rPr>
+                  <a:t> </a:t>
+                </a:r>
+              </a:p>
+            </p:txBody>
+          </p:sp>
+        </mc:Fallback>
+      </mc:AlternateContent>
+      <p:sp>
+        <p:nvSpPr>
+          <p:cNvPr id="4" name="Foliennummernplatzhalter 3"/>
+          <p:cNvSpPr>
+            <a:spLocks noGrp="1"/>
+          </p:cNvSpPr>
+          <p:nvPr>
+            <p:ph type="sldNum" sz="quarter" idx="12"/>
+          </p:nvPr>
+        </p:nvSpPr>
+        <p:spPr/>
+        <p:txBody>
+          <a:bodyPr/>
+          <a:lstStyle/>
+          <a:p>
+            <a:fld id="{15BF1572-E7A8-4393-8AEC-CE9971F61807}" type="slidenum">
+              <a:rPr lang="de-DE" smtClean="0"/>
+              <a:t>6</a:t>
+            </a:fld>
+            <a:endParaRPr lang="de-DE"/>
+          </a:p>
+        </p:txBody>
+      </p:sp>
+    </p:spTree>
+    <p:extLst>
+      <p:ext uri="{BB962C8B-B14F-4D97-AF65-F5344CB8AC3E}">
+        <p14:creationId xmlns:p14="http://schemas.microsoft.com/office/powerpoint/2010/main" val="472010197"/>
+      </p:ext>
+    </p:extLst>
+  </p:cSld>
+  <p:clrMapOvr>
+    <a:masterClrMapping/>
+  </p:clrMapOvr>
+</p:sld>
+</file>
+
+<file path=ppt/slides/slide7.xml><?xml version="1.0" encoding="utf-8"?>
+<p:sld xmlns:a="http://schemas.openxmlformats.org/drawingml/2006/main" xmlns:r="http://schemas.openxmlformats.org/officeDocument/2006/relationships" xmlns:p="http://schemas.openxmlformats.org/presentationml/2006/main">
+  <p:cSld>
+    <p:spTree>
+      <p:nvGrpSpPr>
+        <p:cNvPr id="1" name=""/>
+        <p:cNvGrpSpPr/>
+        <p:nvPr/>
+      </p:nvGrpSpPr>
+      <p:grpSpPr>
+        <a:xfrm>
+          <a:off x="0" y="0"/>
+          <a:ext cx="0" cy="0"/>
+          <a:chOff x="0" y="0"/>
+          <a:chExt cx="0" cy="0"/>
+        </a:xfrm>
+      </p:grpSpPr>
+      <p:sp>
+        <p:nvSpPr>
+          <p:cNvPr id="2" name="Titel 1"/>
+          <p:cNvSpPr>
+            <a:spLocks noGrp="1"/>
+          </p:cNvSpPr>
+          <p:nvPr>
+            <p:ph type="title"/>
+          </p:nvPr>
+        </p:nvSpPr>
         <p:spPr>
           <a:xfrm>
             <a:off x="2592925" y="545729"/>
@@ -15105,7 +15587,6 @@
               <a:rPr lang="de-DE" sz="2600" dirty="0" smtClean="0"/>
               <a:t> werden automatisch eingelesen</a:t>
             </a:r>
-            <a:endParaRPr lang="de-DE" sz="2600" dirty="0" smtClean="0"/>
           </a:p>
           <a:p>
             <a:pPr lvl="1">
@@ -15117,7 +15598,6 @@
               <a:rPr lang="de-DE" sz="2800" dirty="0" smtClean="0"/>
               <a:t>Maximal 2 (Weil N-Stocks die Algorithmen zur Berechnung sonst zu kompliziert werden)</a:t>
             </a:r>
-            <a:endParaRPr lang="de-DE" sz="2800" dirty="0" smtClean="0"/>
           </a:p>
         </p:txBody>
       </p:sp>
@@ -15138,7 +15618,7 @@
           <a:p>
             <a:fld id="{15BF1572-E7A8-4393-8AEC-CE9971F61807}" type="slidenum">
               <a:rPr lang="de-DE" smtClean="0"/>
-              <a:t>6</a:t>
+              <a:t>7</a:t>
             </a:fld>
             <a:endParaRPr lang="de-DE"/>
           </a:p>
@@ -15148,6 +15628,186 @@
     <p:extLst>
       <p:ext uri="{BB962C8B-B14F-4D97-AF65-F5344CB8AC3E}">
         <p14:creationId xmlns:p14="http://schemas.microsoft.com/office/powerpoint/2010/main" val="1241103291"/>
+      </p:ext>
+    </p:extLst>
+  </p:cSld>
+  <p:clrMapOvr>
+    <a:masterClrMapping/>
+  </p:clrMapOvr>
+  <p:timing>
+    <p:tnLst>
+      <p:par>
+        <p:cTn id="1" dur="indefinite" restart="never" nodeType="tmRoot"/>
+      </p:par>
+    </p:tnLst>
+  </p:timing>
+</p:sld>
+</file>
+
+<file path=ppt/slides/slide8.xml><?xml version="1.0" encoding="utf-8"?>
+<p:sld xmlns:a="http://schemas.openxmlformats.org/drawingml/2006/main" xmlns:r="http://schemas.openxmlformats.org/officeDocument/2006/relationships" xmlns:p="http://schemas.openxmlformats.org/presentationml/2006/main">
+  <p:cSld>
+    <p:spTree>
+      <p:nvGrpSpPr>
+        <p:cNvPr id="1" name=""/>
+        <p:cNvGrpSpPr/>
+        <p:nvPr/>
+      </p:nvGrpSpPr>
+      <p:grpSpPr>
+        <a:xfrm>
+          <a:off x="0" y="0"/>
+          <a:ext cx="0" cy="0"/>
+          <a:chOff x="0" y="0"/>
+          <a:chExt cx="0" cy="0"/>
+        </a:xfrm>
+      </p:grpSpPr>
+      <p:sp>
+        <p:nvSpPr>
+          <p:cNvPr id="2" name="Titel 1"/>
+          <p:cNvSpPr>
+            <a:spLocks noGrp="1"/>
+          </p:cNvSpPr>
+          <p:nvPr>
+            <p:ph type="title"/>
+          </p:nvPr>
+        </p:nvSpPr>
+        <p:spPr>
+          <a:xfrm>
+            <a:off x="2592925" y="545729"/>
+            <a:ext cx="8911687" cy="1280890"/>
+          </a:xfrm>
+        </p:spPr>
+        <p:txBody>
+          <a:bodyPr>
+            <a:normAutofit/>
+          </a:bodyPr>
+          <a:lstStyle/>
+          <a:p>
+            <a:r>
+              <a:rPr lang="de-DE" sz="4800" dirty="0" smtClean="0"/>
+              <a:t>Unser Tool</a:t>
+            </a:r>
+            <a:endParaRPr lang="de-DE" dirty="0">
+              <a:solidFill>
+                <a:schemeClr val="tx1">
+                  <a:lumMod val="50000"/>
+                  <a:lumOff val="50000"/>
+                </a:schemeClr>
+              </a:solidFill>
+            </a:endParaRPr>
+          </a:p>
+        </p:txBody>
+      </p:sp>
+      <p:sp>
+        <p:nvSpPr>
+          <p:cNvPr id="3" name="Inhaltsplatzhalter 2"/>
+          <p:cNvSpPr>
+            <a:spLocks noGrp="1"/>
+          </p:cNvSpPr>
+          <p:nvPr>
+            <p:ph idx="1"/>
+          </p:nvPr>
+        </p:nvSpPr>
+        <p:spPr>
+          <a:xfrm>
+            <a:off x="2159726" y="2222977"/>
+            <a:ext cx="9474925" cy="3777622"/>
+          </a:xfrm>
+        </p:spPr>
+        <p:txBody>
+          <a:bodyPr>
+            <a:normAutofit/>
+          </a:bodyPr>
+          <a:lstStyle/>
+          <a:p>
+            <a:pPr>
+              <a:lnSpc>
+                <a:spcPct val="150000"/>
+              </a:lnSpc>
+            </a:pPr>
+            <a:r>
+              <a:rPr lang="de-DE" sz="2800" dirty="0" smtClean="0"/>
+              <a:t>Folgende Parameter können festgelegt werden</a:t>
+            </a:r>
+          </a:p>
+          <a:p>
+            <a:pPr lvl="1">
+              <a:lnSpc>
+                <a:spcPct val="150000"/>
+              </a:lnSpc>
+            </a:pPr>
+            <a:r>
+              <a:rPr lang="de-DE" sz="2400" dirty="0" smtClean="0"/>
+              <a:t>Cash/Stock Aufteilung</a:t>
+            </a:r>
+          </a:p>
+          <a:p>
+            <a:pPr lvl="1">
+              <a:lnSpc>
+                <a:spcPct val="150000"/>
+              </a:lnSpc>
+            </a:pPr>
+            <a:r>
+              <a:rPr lang="de-DE" sz="2400" dirty="0" smtClean="0"/>
+              <a:t>Zinssatz für Cash</a:t>
+            </a:r>
+          </a:p>
+          <a:p>
+            <a:pPr>
+              <a:lnSpc>
+                <a:spcPct val="150000"/>
+              </a:lnSpc>
+            </a:pPr>
+            <a:r>
+              <a:rPr lang="de-DE" sz="2800" dirty="0" smtClean="0"/>
+              <a:t>Grafische Darstellung der Portfoliomöglichkeitskurve</a:t>
+            </a:r>
+          </a:p>
+          <a:p>
+            <a:pPr lvl="1">
+              <a:lnSpc>
+                <a:spcPct val="150000"/>
+              </a:lnSpc>
+            </a:pPr>
+            <a:r>
+              <a:rPr lang="de-DE" sz="2600" dirty="0" smtClean="0"/>
+              <a:t>MVP und optimal </a:t>
+            </a:r>
+            <a:r>
+              <a:rPr lang="de-DE" sz="2600" smtClean="0"/>
+              <a:t>riskantes Portfolioverteilung</a:t>
+            </a:r>
+            <a:endParaRPr lang="de-DE" sz="2600" dirty="0" smtClean="0"/>
+          </a:p>
+        </p:txBody>
+      </p:sp>
+      <p:sp>
+        <p:nvSpPr>
+          <p:cNvPr id="6" name="Foliennummernplatzhalter 5"/>
+          <p:cNvSpPr>
+            <a:spLocks noGrp="1"/>
+          </p:cNvSpPr>
+          <p:nvPr>
+            <p:ph type="sldNum" sz="quarter" idx="12"/>
+          </p:nvPr>
+        </p:nvSpPr>
+        <p:spPr/>
+        <p:txBody>
+          <a:bodyPr/>
+          <a:lstStyle/>
+          <a:p>
+            <a:fld id="{15BF1572-E7A8-4393-8AEC-CE9971F61807}" type="slidenum">
+              <a:rPr lang="de-DE" smtClean="0"/>
+              <a:t>8</a:t>
+            </a:fld>
+            <a:endParaRPr lang="de-DE"/>
+          </a:p>
+        </p:txBody>
+      </p:sp>
+    </p:spTree>
+    <p:extLst>
+      <p:ext uri="{BB962C8B-B14F-4D97-AF65-F5344CB8AC3E}">
+        <p14:creationId xmlns:p14="http://schemas.microsoft.com/office/powerpoint/2010/main" val="606792096"/>
       </p:ext>
     </p:extLst>
   </p:cSld>

</xml_diff>